<commit_message>
chore: elaborazione PowerPoint solo della categoria selezionata, correzione eccezione di doppia chiusura, pulizia codice con ReSharper
</commit_message>
<xml_diff>
--- a/Desktop/Desktop/Assets/ProductTemplate.pptx
+++ b/Desktop/Desktop/Assets/ProductTemplate.pptx
@@ -2333,10 +2333,10 @@
       </p:sp>
       <p:sp>
         <p:nvSpPr>
-          <p:cNvPr id="3" name="Logo">
+          <p:cNvPr id="2" name="Foto">
             <a:extLst>
               <a:ext uri="{FF2B5EF4-FFF2-40B4-BE49-F238E27FC236}">
-                <a16:creationId xmlns:a16="http://schemas.microsoft.com/office/drawing/2014/main" id="{606DE25E-33C3-6F73-347E-EEE40FA1C95D}"/>
+                <a16:creationId xmlns:a16="http://schemas.microsoft.com/office/drawing/2014/main" id="{9975343D-A0EF-7CAE-9B29-798B3DFAF2A6}"/>
               </a:ext>
             </a:extLst>
           </p:cNvPr>
@@ -2344,7 +2344,7 @@
             <a:spLocks noGrp="1"/>
           </p:cNvSpPr>
           <p:nvPr>
-            <p:ph sz="quarter" idx="14"/>
+            <p:ph sz="quarter" idx="13"/>
           </p:nvPr>
         </p:nvSpPr>
         <p:spPr/>
@@ -2358,10 +2358,10 @@
       </p:sp>
       <p:sp>
         <p:nvSpPr>
-          <p:cNvPr id="2" name="Foto">
+          <p:cNvPr id="3" name="Logo">
             <a:extLst>
               <a:ext uri="{FF2B5EF4-FFF2-40B4-BE49-F238E27FC236}">
-                <a16:creationId xmlns:a16="http://schemas.microsoft.com/office/drawing/2014/main" id="{9975343D-A0EF-7CAE-9B29-798B3DFAF2A6}"/>
+                <a16:creationId xmlns:a16="http://schemas.microsoft.com/office/drawing/2014/main" id="{606DE25E-33C3-6F73-347E-EEE40FA1C95D}"/>
               </a:ext>
             </a:extLst>
           </p:cNvPr>
@@ -2369,7 +2369,7 @@
             <a:spLocks noGrp="1"/>
           </p:cNvSpPr>
           <p:nvPr>
-            <p:ph sz="quarter" idx="13"/>
+            <p:ph sz="quarter" idx="14"/>
           </p:nvPr>
         </p:nvSpPr>
         <p:spPr/>
@@ -2538,10 +2538,10 @@
       </p:sp>
       <p:sp>
         <p:nvSpPr>
-          <p:cNvPr id="4" name="Logo">
+          <p:cNvPr id="5" name="Logo">
             <a:extLst>
               <a:ext uri="{FF2B5EF4-FFF2-40B4-BE49-F238E27FC236}">
-                <a16:creationId xmlns:a16="http://schemas.microsoft.com/office/drawing/2014/main" id="{B20F9A11-5E29-BC2D-079A-12B7B540CDC3}"/>
+                <a16:creationId xmlns:a16="http://schemas.microsoft.com/office/drawing/2014/main" id="{271FE877-21A2-CF3E-F8BE-95281EA3BB44}"/>
               </a:ext>
             </a:extLst>
           </p:cNvPr>
@@ -2578,10 +2578,6 @@
           </p:nvPr>
         </p:nvSpPr>
         <p:spPr>
-          <a:xfrm>
-            <a:off x="30452" y="6474304"/>
-            <a:ext cx="4114800" cy="365125"/>
-          </a:xfrm>
           <a:prstGeom prst="rect">
             <a:avLst/>
           </a:prstGeom>
@@ -3496,10 +3492,10 @@
       </p:sp>
       <p:sp>
         <p:nvSpPr>
-          <p:cNvPr id="4" name="Logo">
+          <p:cNvPr id="2" name="Logo">
             <a:extLst>
               <a:ext uri="{FF2B5EF4-FFF2-40B4-BE49-F238E27FC236}">
-                <a16:creationId xmlns:a16="http://schemas.microsoft.com/office/drawing/2014/main" id="{4437AC74-4E02-C392-E400-504E4783285E}"/>
+                <a16:creationId xmlns:a16="http://schemas.microsoft.com/office/drawing/2014/main" id="{3E918FE7-4B25-39A0-BA85-C5EC05031081}"/>
               </a:ext>
             </a:extLst>
           </p:cNvPr>
@@ -3516,6 +3512,69 @@
           <a:lstStyle/>
           <a:p>
             <a:endParaRPr lang="it-IT"/>
+          </a:p>
+        </p:txBody>
+      </p:sp>
+      <p:sp>
+        <p:nvSpPr>
+          <p:cNvPr id="5" name="Footer">
+            <a:extLst>
+              <a:ext uri="{FF2B5EF4-FFF2-40B4-BE49-F238E27FC236}">
+                <a16:creationId xmlns:a16="http://schemas.microsoft.com/office/drawing/2014/main" id="{5F68B73B-8C65-8BDA-4470-4746B8F73DE1}"/>
+              </a:ext>
+            </a:extLst>
+          </p:cNvPr>
+          <p:cNvSpPr>
+            <a:spLocks noGrp="1"/>
+          </p:cNvSpPr>
+          <p:nvPr>
+            <p:ph type="ftr" sz="quarter" idx="3"/>
+          </p:nvPr>
+        </p:nvSpPr>
+        <p:spPr>
+          <a:prstGeom prst="rect">
+            <a:avLst/>
+          </a:prstGeom>
+        </p:spPr>
+        <p:txBody>
+          <a:bodyPr vert="horz" lIns="91440" tIns="45720" rIns="91440" bIns="45720" rtlCol="0" anchor="ctr"/>
+          <a:lstStyle>
+            <a:lvl1pPr algn="l">
+              <a:defRPr sz="1200">
+                <a:solidFill>
+                  <a:schemeClr val="tx1">
+                    <a:tint val="82000"/>
+                  </a:schemeClr>
+                </a:solidFill>
+              </a:defRPr>
+            </a:lvl1pPr>
+          </a:lstStyle>
+          <a:p>
+            <a:pPr algn="l">
+              <a:buFontTx/>
+              <a:buNone/>
+            </a:pPr>
+            <a:r>
+              <a:rPr lang="it-IT">
+                <a:solidFill>
+                  <a:schemeClr val="bg1">
+                    <a:lumMod val="75000"/>
+                  </a:schemeClr>
+                </a:solidFill>
+                <a:latin typeface="Avenir Next LT Pro Light" panose="020B0304020202020204" pitchFamily="34" charset="0"/>
+                <a:cs typeface="Calibri" panose="020F0502020204030204" pitchFamily="34" charset="0"/>
+              </a:rPr>
+              <a:t>[[TITOLO]] – job [[JOB]] – [[DATA]]</a:t>
+            </a:r>
+            <a:endParaRPr lang="it-IT" dirty="0">
+              <a:solidFill>
+                <a:schemeClr val="bg1">
+                  <a:lumMod val="75000"/>
+                </a:schemeClr>
+              </a:solidFill>
+              <a:latin typeface="Avenir Next LT Pro Light" panose="020B0304020202020204" pitchFamily="34" charset="0"/>
+              <a:cs typeface="Calibri" panose="020F0502020204030204" pitchFamily="34" charset="0"/>
+            </a:endParaRPr>
           </a:p>
         </p:txBody>
       </p:sp>
@@ -3701,73 +3760,6 @@
               </a:rPr>
               <a:t>Tavole sinottiche indici di performance</a:t>
             </a:r>
-          </a:p>
-        </p:txBody>
-      </p:sp>
-      <p:sp>
-        <p:nvSpPr>
-          <p:cNvPr id="5" name="Footer">
-            <a:extLst>
-              <a:ext uri="{FF2B5EF4-FFF2-40B4-BE49-F238E27FC236}">
-                <a16:creationId xmlns:a16="http://schemas.microsoft.com/office/drawing/2014/main" id="{5F68B73B-8C65-8BDA-4470-4746B8F73DE1}"/>
-              </a:ext>
-            </a:extLst>
-          </p:cNvPr>
-          <p:cNvSpPr>
-            <a:spLocks noGrp="1"/>
-          </p:cNvSpPr>
-          <p:nvPr>
-            <p:ph type="ftr" sz="quarter" idx="3"/>
-          </p:nvPr>
-        </p:nvSpPr>
-        <p:spPr>
-          <a:xfrm>
-            <a:off x="30452" y="6474304"/>
-            <a:ext cx="4114800" cy="365125"/>
-          </a:xfrm>
-          <a:prstGeom prst="rect">
-            <a:avLst/>
-          </a:prstGeom>
-        </p:spPr>
-        <p:txBody>
-          <a:bodyPr vert="horz" lIns="91440" tIns="45720" rIns="91440" bIns="45720" rtlCol="0" anchor="ctr"/>
-          <a:lstStyle>
-            <a:lvl1pPr algn="l">
-              <a:defRPr sz="1200">
-                <a:solidFill>
-                  <a:schemeClr val="tx1">
-                    <a:tint val="82000"/>
-                  </a:schemeClr>
-                </a:solidFill>
-              </a:defRPr>
-            </a:lvl1pPr>
-          </a:lstStyle>
-          <a:p>
-            <a:pPr algn="l">
-              <a:buFontTx/>
-              <a:buNone/>
-            </a:pPr>
-            <a:r>
-              <a:rPr lang="it-IT">
-                <a:solidFill>
-                  <a:schemeClr val="bg1">
-                    <a:lumMod val="75000"/>
-                  </a:schemeClr>
-                </a:solidFill>
-                <a:latin typeface="Avenir Next LT Pro Light" panose="020B0304020202020204" pitchFamily="34" charset="0"/>
-                <a:cs typeface="Calibri" panose="020F0502020204030204" pitchFamily="34" charset="0"/>
-              </a:rPr>
-              <a:t>[[TITOLO]] – job [[JOB]] – [[DATA]]</a:t>
-            </a:r>
-            <a:endParaRPr lang="it-IT" dirty="0">
-              <a:solidFill>
-                <a:schemeClr val="bg1">
-                  <a:lumMod val="75000"/>
-                </a:schemeClr>
-              </a:solidFill>
-              <a:latin typeface="Avenir Next LT Pro Light" panose="020B0304020202020204" pitchFamily="34" charset="0"/>
-              <a:cs typeface="Calibri" panose="020F0502020204030204" pitchFamily="34" charset="0"/>
-            </a:endParaRPr>
           </a:p>
         </p:txBody>
       </p:sp>
@@ -4273,10 +4265,10 @@
       </p:sp>
       <p:sp>
         <p:nvSpPr>
-          <p:cNvPr id="3" name="Logo">
+          <p:cNvPr id="7" name="Logo">
             <a:extLst>
               <a:ext uri="{FF2B5EF4-FFF2-40B4-BE49-F238E27FC236}">
-                <a16:creationId xmlns:a16="http://schemas.microsoft.com/office/drawing/2014/main" id="{95488006-41B0-E8F9-F82D-EF29476A3E57}"/>
+                <a16:creationId xmlns:a16="http://schemas.microsoft.com/office/drawing/2014/main" id="{758B33FF-A52F-4630-6153-1E9EB993811A}"/>
               </a:ext>
             </a:extLst>
           </p:cNvPr>
@@ -4313,10 +4305,6 @@
           </p:nvPr>
         </p:nvSpPr>
         <p:spPr>
-          <a:xfrm>
-            <a:off x="30452" y="6474304"/>
-            <a:ext cx="4114800" cy="365125"/>
-          </a:xfrm>
           <a:prstGeom prst="rect">
             <a:avLst/>
           </a:prstGeom>
@@ -4425,6 +4413,69 @@
           </a:p>
         </p:txBody>
       </p:sp>
+      <p:sp>
+        <p:nvSpPr>
+          <p:cNvPr id="3" name="Footer">
+            <a:extLst>
+              <a:ext uri="{FF2B5EF4-FFF2-40B4-BE49-F238E27FC236}">
+                <a16:creationId xmlns:a16="http://schemas.microsoft.com/office/drawing/2014/main" id="{425D3446-6E0F-40C1-3096-CD3F1D6CC01B}"/>
+              </a:ext>
+            </a:extLst>
+          </p:cNvPr>
+          <p:cNvSpPr>
+            <a:spLocks noGrp="1"/>
+          </p:cNvSpPr>
+          <p:nvPr>
+            <p:ph type="ftr" sz="quarter" idx="3"/>
+          </p:nvPr>
+        </p:nvSpPr>
+        <p:spPr>
+          <a:prstGeom prst="rect">
+            <a:avLst/>
+          </a:prstGeom>
+        </p:spPr>
+        <p:txBody>
+          <a:bodyPr vert="horz" lIns="91440" tIns="45720" rIns="91440" bIns="45720" rtlCol="0" anchor="ctr"/>
+          <a:lstStyle>
+            <a:lvl1pPr algn="l">
+              <a:defRPr sz="1200">
+                <a:solidFill>
+                  <a:schemeClr val="tx1">
+                    <a:tint val="82000"/>
+                  </a:schemeClr>
+                </a:solidFill>
+              </a:defRPr>
+            </a:lvl1pPr>
+          </a:lstStyle>
+          <a:p>
+            <a:pPr algn="l">
+              <a:buFontTx/>
+              <a:buNone/>
+            </a:pPr>
+            <a:r>
+              <a:rPr lang="it-IT">
+                <a:solidFill>
+                  <a:schemeClr val="bg1">
+                    <a:lumMod val="75000"/>
+                  </a:schemeClr>
+                </a:solidFill>
+                <a:latin typeface="Avenir Next LT Pro Light" panose="020B0304020202020204" pitchFamily="34" charset="0"/>
+                <a:cs typeface="Calibri" panose="020F0502020204030204" pitchFamily="34" charset="0"/>
+              </a:rPr>
+              <a:t>[[TITOLO]] – job [[JOB]] – [[DATA]]</a:t>
+            </a:r>
+            <a:endParaRPr lang="it-IT" dirty="0">
+              <a:solidFill>
+                <a:schemeClr val="bg1">
+                  <a:lumMod val="75000"/>
+                </a:schemeClr>
+              </a:solidFill>
+              <a:latin typeface="Avenir Next LT Pro Light" panose="020B0304020202020204" pitchFamily="34" charset="0"/>
+              <a:cs typeface="Calibri" panose="020F0502020204030204" pitchFamily="34" charset="0"/>
+            </a:endParaRPr>
+          </a:p>
+        </p:txBody>
+      </p:sp>
       <p:graphicFrame>
         <p:nvGraphicFramePr>
           <p:cNvPr id="7" name="SchedaProdotto">
@@ -5317,77 +5368,10 @@
       </p:graphicFrame>
       <p:sp>
         <p:nvSpPr>
-          <p:cNvPr id="3" name="Footer">
+          <p:cNvPr id="8" name="Foto4">
             <a:extLst>
               <a:ext uri="{FF2B5EF4-FFF2-40B4-BE49-F238E27FC236}">
-                <a16:creationId xmlns:a16="http://schemas.microsoft.com/office/drawing/2014/main" id="{425D3446-6E0F-40C1-3096-CD3F1D6CC01B}"/>
-              </a:ext>
-            </a:extLst>
-          </p:cNvPr>
-          <p:cNvSpPr>
-            <a:spLocks noGrp="1"/>
-          </p:cNvSpPr>
-          <p:nvPr>
-            <p:ph type="ftr" sz="quarter" idx="3"/>
-          </p:nvPr>
-        </p:nvSpPr>
-        <p:spPr>
-          <a:xfrm>
-            <a:off x="30452" y="6474304"/>
-            <a:ext cx="4114800" cy="365125"/>
-          </a:xfrm>
-          <a:prstGeom prst="rect">
-            <a:avLst/>
-          </a:prstGeom>
-        </p:spPr>
-        <p:txBody>
-          <a:bodyPr vert="horz" lIns="91440" tIns="45720" rIns="91440" bIns="45720" rtlCol="0" anchor="ctr"/>
-          <a:lstStyle>
-            <a:lvl1pPr algn="l">
-              <a:defRPr sz="1200">
-                <a:solidFill>
-                  <a:schemeClr val="tx1">
-                    <a:tint val="82000"/>
-                  </a:schemeClr>
-                </a:solidFill>
-              </a:defRPr>
-            </a:lvl1pPr>
-          </a:lstStyle>
-          <a:p>
-            <a:pPr algn="l">
-              <a:buFontTx/>
-              <a:buNone/>
-            </a:pPr>
-            <a:r>
-              <a:rPr lang="it-IT">
-                <a:solidFill>
-                  <a:schemeClr val="bg1">
-                    <a:lumMod val="75000"/>
-                  </a:schemeClr>
-                </a:solidFill>
-                <a:latin typeface="Avenir Next LT Pro Light" panose="020B0304020202020204" pitchFamily="34" charset="0"/>
-                <a:cs typeface="Calibri" panose="020F0502020204030204" pitchFamily="34" charset="0"/>
-              </a:rPr>
-              <a:t>[[TITOLO]] – job [[JOB]] – [[DATA]]</a:t>
-            </a:r>
-            <a:endParaRPr lang="it-IT" dirty="0">
-              <a:solidFill>
-                <a:schemeClr val="bg1">
-                  <a:lumMod val="75000"/>
-                </a:schemeClr>
-              </a:solidFill>
-              <a:latin typeface="Avenir Next LT Pro Light" panose="020B0304020202020204" pitchFamily="34" charset="0"/>
-              <a:cs typeface="Calibri" panose="020F0502020204030204" pitchFamily="34" charset="0"/>
-            </a:endParaRPr>
-          </a:p>
-        </p:txBody>
-      </p:sp>
-      <p:sp>
-        <p:nvSpPr>
-          <p:cNvPr id="20" name="Foto4">
-            <a:extLst>
-              <a:ext uri="{FF2B5EF4-FFF2-40B4-BE49-F238E27FC236}">
-                <a16:creationId xmlns:a16="http://schemas.microsoft.com/office/drawing/2014/main" id="{91B5BBE4-75C4-E5D7-DC0A-C960D3C2DBFD}"/>
+                <a16:creationId xmlns:a16="http://schemas.microsoft.com/office/drawing/2014/main" id="{FE29CCCB-A5C8-52EA-6ED6-2EEBF03B0B72}"/>
               </a:ext>
             </a:extLst>
           </p:cNvPr>
@@ -5409,10 +5393,10 @@
       </p:sp>
       <p:sp>
         <p:nvSpPr>
-          <p:cNvPr id="19" name="Foto3">
+          <p:cNvPr id="6" name="Foto3">
             <a:extLst>
               <a:ext uri="{FF2B5EF4-FFF2-40B4-BE49-F238E27FC236}">
-                <a16:creationId xmlns:a16="http://schemas.microsoft.com/office/drawing/2014/main" id="{B840DEFE-B523-BD54-ED62-3FDD201F073B}"/>
+                <a16:creationId xmlns:a16="http://schemas.microsoft.com/office/drawing/2014/main" id="{904956CC-ED3C-882A-0D26-281FCB9C0444}"/>
               </a:ext>
             </a:extLst>
           </p:cNvPr>
@@ -5434,10 +5418,10 @@
       </p:sp>
       <p:sp>
         <p:nvSpPr>
-          <p:cNvPr id="18" name="Foto2">
+          <p:cNvPr id="5" name="Foto2">
             <a:extLst>
               <a:ext uri="{FF2B5EF4-FFF2-40B4-BE49-F238E27FC236}">
-                <a16:creationId xmlns:a16="http://schemas.microsoft.com/office/drawing/2014/main" id="{214D4331-42F1-C209-2E36-3099A06D72E7}"/>
+                <a16:creationId xmlns:a16="http://schemas.microsoft.com/office/drawing/2014/main" id="{453DF175-5306-967A-B0C3-A23537D8AD9B}"/>
               </a:ext>
             </a:extLst>
           </p:cNvPr>
@@ -5459,10 +5443,10 @@
       </p:sp>
       <p:sp>
         <p:nvSpPr>
-          <p:cNvPr id="17" name="Foto1">
+          <p:cNvPr id="4" name="Foto1">
             <a:extLst>
               <a:ext uri="{FF2B5EF4-FFF2-40B4-BE49-F238E27FC236}">
-                <a16:creationId xmlns:a16="http://schemas.microsoft.com/office/drawing/2014/main" id="{490CBC86-8010-C7FA-CDD6-797DAC9A9FA6}"/>
+                <a16:creationId xmlns:a16="http://schemas.microsoft.com/office/drawing/2014/main" id="{938A9E8D-F8DD-835A-E58E-8453C328B120}"/>
               </a:ext>
             </a:extLst>
           </p:cNvPr>

</xml_diff>